<commit_message>
Added sample code for week 3.
</commit_message>
<xml_diff>
--- a/Weeks 3/Notes Week 3.pptx
+++ b/Weeks 3/Notes Week 3.pptx
@@ -112,6 +112,11 @@
       </a:defRPr>
     </a:lvl9pPr>
   </p:defaultTextStyle>
+  <p:extLst>
+    <p:ext uri="{EFAFB233-063F-42B5-8137-9DF3F51BA10A}">
+      <p15:sldGuideLst xmlns:p15="http://schemas.microsoft.com/office/powerpoint/2012/main"/>
+    </p:ext>
+  </p:extLst>
 </p:presentation>
 </file>
 
@@ -311,7 +316,7 @@
           <a:p>
             <a:fld id="{ECD19FB2-3AAB-4D03-B13A-2960828C78E3}" type="datetimeFigureOut">
               <a:rPr lang="en-US" dirty="0"/>
-              <a:t>10/13/2015</a:t>
+              <a:t>10/14/2015</a:t>
             </a:fld>
             <a:endParaRPr lang="en-US" dirty="0"/>
           </a:p>
@@ -592,7 +597,7 @@
           <a:p>
             <a:fld id="{1B80C674-7DFC-42FE-B9CD-82963CDB1557}" type="datetimeFigureOut">
               <a:rPr lang="en-US" dirty="0"/>
-              <a:t>10/13/2015</a:t>
+              <a:t>10/14/2015</a:t>
             </a:fld>
             <a:endParaRPr lang="en-US" dirty="0"/>
           </a:p>
@@ -783,7 +788,7 @@
           <a:p>
             <a:fld id="{2076456F-F47D-4F25-8053-2A695DA0CA7D}" type="datetimeFigureOut">
               <a:rPr lang="en-US" dirty="0"/>
-              <a:t>10/13/2015</a:t>
+              <a:t>10/14/2015</a:t>
             </a:fld>
             <a:endParaRPr lang="en-US" dirty="0"/>
           </a:p>
@@ -1043,7 +1048,7 @@
           <a:p>
             <a:fld id="{5D6C7379-69CC-4837-9905-BEBA22830C8A}" type="datetimeFigureOut">
               <a:rPr lang="en-US" dirty="0"/>
-              <a:t>10/13/2015</a:t>
+              <a:t>10/14/2015</a:t>
             </a:fld>
             <a:endParaRPr lang="en-US" dirty="0"/>
           </a:p>
@@ -1468,7 +1473,7 @@
           <a:p>
             <a:fld id="{49EB8B7E-8AEE-4F10-BFEE-C999AD004D36}" type="datetimeFigureOut">
               <a:rPr lang="en-US" dirty="0"/>
-              <a:t>10/13/2015</a:t>
+              <a:t>10/14/2015</a:t>
             </a:fld>
             <a:endParaRPr lang="en-US" dirty="0"/>
           </a:p>
@@ -2013,7 +2018,7 @@
           <a:p>
             <a:fld id="{8668F3F9-58BC-440B-B37B-805B9055EF92}" type="datetimeFigureOut">
               <a:rPr lang="en-US" dirty="0"/>
-              <a:t>10/13/2015</a:t>
+              <a:t>10/14/2015</a:t>
             </a:fld>
             <a:endParaRPr lang="en-US" dirty="0"/>
           </a:p>
@@ -2843,7 +2848,7 @@
           <a:p>
             <a:fld id="{0D5A53AF-48EA-489D-8260-9DCAB666386A}" type="datetimeFigureOut">
               <a:rPr lang="en-US" dirty="0"/>
-              <a:t>10/13/2015</a:t>
+              <a:t>10/14/2015</a:t>
             </a:fld>
             <a:endParaRPr lang="en-US" dirty="0"/>
           </a:p>
@@ -3012,7 +3017,7 @@
           <a:p>
             <a:fld id="{0DED02AE-B9A4-47BD-AF8E-97E16144138B}" type="datetimeFigureOut">
               <a:rPr lang="en-US" dirty="0"/>
-              <a:t>10/13/2015</a:t>
+              <a:t>10/14/2015</a:t>
             </a:fld>
             <a:endParaRPr lang="en-US" dirty="0"/>
           </a:p>
@@ -3191,7 +3196,7 @@
           <a:p>
             <a:fld id="{CF0FD78B-DB02-4362-BCDC-98A55456977C}" type="datetimeFigureOut">
               <a:rPr lang="en-US" dirty="0"/>
-              <a:t>10/13/2015</a:t>
+              <a:t>10/14/2015</a:t>
             </a:fld>
             <a:endParaRPr lang="en-US" dirty="0"/>
           </a:p>
@@ -3360,7 +3365,7 @@
           <a:p>
             <a:fld id="{99916976-5D93-46E4-A98A-FAD63E4D0EA8}" type="datetimeFigureOut">
               <a:rPr lang="en-US" dirty="0"/>
-              <a:t>10/13/2015</a:t>
+              <a:t>10/14/2015</a:t>
             </a:fld>
             <a:endParaRPr lang="en-US" dirty="0"/>
           </a:p>
@@ -3616,7 +3621,7 @@
           <a:p>
             <a:fld id="{0F39F4F5-F4D2-4D2A-AB60-88D37ADCB869}" type="datetimeFigureOut">
               <a:rPr lang="en-US" dirty="0"/>
-              <a:t>10/13/2015</a:t>
+              <a:t>10/14/2015</a:t>
             </a:fld>
             <a:endParaRPr lang="en-US" dirty="0"/>
           </a:p>
@@ -3847,7 +3852,7 @@
           <a:p>
             <a:fld id="{D23BC6CE-6D1E-47E5-8859-F31AC5380EB2}" type="datetimeFigureOut">
               <a:rPr lang="en-US" dirty="0"/>
-              <a:t>10/13/2015</a:t>
+              <a:t>10/14/2015</a:t>
             </a:fld>
             <a:endParaRPr lang="en-US" dirty="0"/>
           </a:p>
@@ -4239,7 +4244,7 @@
           <a:p>
             <a:fld id="{B1B4E7C4-4DA4-404D-9965-B13F2DD7D8BF}" type="datetimeFigureOut">
               <a:rPr lang="en-US" dirty="0"/>
-              <a:t>10/13/2015</a:t>
+              <a:t>10/14/2015</a:t>
             </a:fld>
             <a:endParaRPr lang="en-US" dirty="0"/>
           </a:p>
@@ -4356,7 +4361,7 @@
           <a:p>
             <a:fld id="{476FB7AA-4A53-424F-AD41-70827B6504BA}" type="datetimeFigureOut">
               <a:rPr lang="en-US" dirty="0"/>
-              <a:t>10/13/2015</a:t>
+              <a:t>10/14/2015</a:t>
             </a:fld>
             <a:endParaRPr lang="en-US" dirty="0"/>
           </a:p>
@@ -4450,7 +4455,7 @@
           <a:p>
             <a:fld id="{E7884882-FB12-4BC8-9960-9AD8104D7FAE}" type="datetimeFigureOut">
               <a:rPr lang="en-US" dirty="0"/>
-              <a:t>10/13/2015</a:t>
+              <a:t>10/14/2015</a:t>
             </a:fld>
             <a:endParaRPr lang="en-US" dirty="0"/>
           </a:p>
@@ -4722,7 +4727,7 @@
           <a:p>
             <a:fld id="{F7D1BD23-6E54-4D9D-AD88-A2813C73CC25}" type="datetimeFigureOut">
               <a:rPr lang="en-US" dirty="0"/>
-              <a:t>10/13/2015</a:t>
+              <a:t>10/14/2015</a:t>
             </a:fld>
             <a:endParaRPr lang="en-US" dirty="0"/>
           </a:p>
@@ -5002,7 +5007,7 @@
           <a:p>
             <a:fld id="{1471A834-4F3C-4AF9-9C74-05EC35A0F292}" type="datetimeFigureOut">
               <a:rPr lang="en-US" dirty="0"/>
-              <a:t>10/13/2015</a:t>
+              <a:t>10/14/2015</a:t>
             </a:fld>
             <a:endParaRPr lang="en-US" dirty="0"/>
           </a:p>
@@ -5241,7 +5246,7 @@
           <a:p>
             <a:fld id="{51CF1133-3259-4C45-BABA-5B62D9C6F78D}" type="datetimeFigureOut">
               <a:rPr lang="en-US" dirty="0"/>
-              <a:t>10/13/2015</a:t>
+              <a:t>10/14/2015</a:t>
             </a:fld>
             <a:endParaRPr lang="en-US" dirty="0"/>
           </a:p>
@@ -6388,12 +6393,16 @@
           </a:p>
           <a:p>
             <a:r>
-              <a:rPr lang="en-GB" dirty="0" smtClean="0">
+              <a:rPr lang="en-GB" smtClean="0">
                 <a:latin typeface="Consolas" panose="020B0609020204030204" pitchFamily="49" charset="0"/>
                 <a:cs typeface="Consolas" panose="020B0609020204030204" pitchFamily="49" charset="0"/>
               </a:rPr>
-              <a:t>0x2BAD2B002</a:t>
-            </a:r>
+              <a:t>0x2BADB002</a:t>
+            </a:r>
+            <a:endParaRPr lang="en-GB" dirty="0" smtClean="0">
+              <a:latin typeface="Consolas" panose="020B0609020204030204" pitchFamily="49" charset="0"/>
+              <a:cs typeface="Consolas" panose="020B0609020204030204" pitchFamily="49" charset="0"/>
+            </a:endParaRPr>
           </a:p>
           <a:p>
             <a:r>

</xml_diff>